<commit_message>
[DOC IMP]Rework on Zigbee basic introduction according to PA team's comment.
</commit_message>
<xml_diff>
--- a/files/ZB-2019Q4-ZMGC-Training/source/EmberZnet-and-WSTK.pptx
+++ b/files/ZB-2019Q4-ZMGC-Training/source/EmberZnet-and-WSTK.pptx
@@ -248,7 +248,7 @@
           <a:p>
             <a:fld id="{3CAB3C29-341D-6743-A203-2F7086D57830}" type="datetimeFigureOut">
               <a:rPr lang="en-US" smtClean="0"/>
-              <a:t>2020-02-12</a:t>
+              <a:t>2020-02-13</a:t>
             </a:fld>
             <a:endParaRPr lang="en-US"/>
           </a:p>
@@ -45167,21 +45167,6 @@
 </file>
 
 <file path=customXml/item1.xml><?xml version="1.0" encoding="utf-8"?>
-<p:properties xmlns:p="http://schemas.microsoft.com/office/2006/metadata/properties" xmlns:xsi="http://www.w3.org/2001/XMLSchema-instance" xmlns:pc="http://schemas.microsoft.com/office/infopath/2007/PartnerControls">
-  <documentManagement/>
-</p:properties>
-</file>
-
-<file path=customXml/item2.xml><?xml version="1.0" encoding="utf-8"?>
-<?mso-contentType ?>
-<FormTemplates xmlns="http://schemas.microsoft.com/sharepoint/v3/contenttype/forms">
-  <Display>DocumentLibraryForm</Display>
-  <Edit>DocumentLibraryForm</Edit>
-  <New>DocumentLibraryForm</New>
-</FormTemplates>
-</file>
-
-<file path=customXml/item3.xml><?xml version="1.0" encoding="utf-8"?>
 <ct:contentTypeSchema xmlns:ct="http://schemas.microsoft.com/office/2006/metadata/contentType" xmlns:ma="http://schemas.microsoft.com/office/2006/metadata/properties/metaAttributes" ct:_="" ma:_="" ma:contentTypeName="Document" ma:contentTypeID="0x010100B21F7AB2AB09B744870FD2BB34F58D4C" ma:contentTypeVersion="0" ma:contentTypeDescription="Create a new document." ma:contentTypeScope="" ma:versionID="610a13794e9c15d6bc8a774371eef038">
   <xsd:schema xmlns:xsd="http://www.w3.org/2001/XMLSchema" xmlns:xs="http://www.w3.org/2001/XMLSchema" xmlns:p="http://schemas.microsoft.com/office/2006/metadata/properties" targetNamespace="http://schemas.microsoft.com/office/2006/metadata/properties" ma:root="true" ma:fieldsID="1b05d82d297216baf5b26c55225140df">
     <xsd:element name="properties">
@@ -45295,17 +45280,33 @@
 </ct:contentTypeSchema>
 </file>
 
+<file path=customXml/item2.xml><?xml version="1.0" encoding="utf-8"?>
+<?mso-contentType ?>
+<FormTemplates xmlns="http://schemas.microsoft.com/sharepoint/v3/contenttype/forms">
+  <Display>DocumentLibraryForm</Display>
+  <Edit>DocumentLibraryForm</Edit>
+  <New>DocumentLibraryForm</New>
+</FormTemplates>
+</file>
+
+<file path=customXml/item3.xml><?xml version="1.0" encoding="utf-8"?>
+<p:properties xmlns:p="http://schemas.microsoft.com/office/2006/metadata/properties" xmlns:xsi="http://www.w3.org/2001/XMLSchema-instance" xmlns:pc="http://schemas.microsoft.com/office/infopath/2007/PartnerControls">
+  <documentManagement/>
+</p:properties>
+</file>
+
 <file path=customXml/itemProps1.xml><?xml version="1.0" encoding="utf-8"?>
-<ds:datastoreItem xmlns:ds="http://schemas.openxmlformats.org/officeDocument/2006/customXml" ds:itemID="{88E5C257-99A9-40B2-A1DE-0EB62604DA9C}">
+<ds:datastoreItem xmlns:ds="http://schemas.openxmlformats.org/officeDocument/2006/customXml" ds:itemID="{59925F4A-05CC-4D19-A5F3-6B37E808F6A7}">
   <ds:schemaRefs>
+    <ds:schemaRef ds:uri="http://schemas.microsoft.com/office/2006/metadata/contentType"/>
+    <ds:schemaRef ds:uri="http://schemas.microsoft.com/office/2006/metadata/properties/metaAttributes"/>
+    <ds:schemaRef ds:uri="http://www.w3.org/2001/XMLSchema"/>
+    <ds:schemaRef ds:uri="http://schemas.microsoft.com/office/2006/metadata/properties"/>
+    <ds:schemaRef ds:uri="http://schemas.openxmlformats.org/package/2006/metadata/core-properties"/>
+    <ds:schemaRef ds:uri="http://purl.org/dc/elements/1.1/"/>
     <ds:schemaRef ds:uri="http://purl.org/dc/terms/"/>
-    <ds:schemaRef ds:uri="http://schemas.openxmlformats.org/package/2006/metadata/core-properties"/>
-    <ds:schemaRef ds:uri="http://schemas.microsoft.com/office/2006/documentManagement/types"/>
+    <ds:schemaRef ds:uri="http://schemas.microsoft.com/internal/obd"/>
     <ds:schemaRef ds:uri="http://schemas.microsoft.com/office/infopath/2007/PartnerControls"/>
-    <ds:schemaRef ds:uri="http://purl.org/dc/elements/1.1/"/>
-    <ds:schemaRef ds:uri="http://schemas.microsoft.com/office/2006/metadata/properties"/>
-    <ds:schemaRef ds:uri="http://www.w3.org/XML/1998/namespace"/>
-    <ds:schemaRef ds:uri="http://purl.org/dc/dcmitype/"/>
   </ds:schemaRefs>
 </ds:datastoreItem>
 </file>
@@ -45319,17 +45320,16 @@
 </file>
 
 <file path=customXml/itemProps3.xml><?xml version="1.0" encoding="utf-8"?>
-<ds:datastoreItem xmlns:ds="http://schemas.openxmlformats.org/officeDocument/2006/customXml" ds:itemID="{59925F4A-05CC-4D19-A5F3-6B37E808F6A7}">
+<ds:datastoreItem xmlns:ds="http://schemas.openxmlformats.org/officeDocument/2006/customXml" ds:itemID="{88E5C257-99A9-40B2-A1DE-0EB62604DA9C}">
   <ds:schemaRefs>
-    <ds:schemaRef ds:uri="http://schemas.microsoft.com/office/2006/metadata/contentType"/>
-    <ds:schemaRef ds:uri="http://schemas.microsoft.com/office/2006/metadata/properties/metaAttributes"/>
-    <ds:schemaRef ds:uri="http://www.w3.org/2001/XMLSchema"/>
+    <ds:schemaRef ds:uri="http://purl.org/dc/terms/"/>
+    <ds:schemaRef ds:uri="http://schemas.openxmlformats.org/package/2006/metadata/core-properties"/>
+    <ds:schemaRef ds:uri="http://schemas.microsoft.com/office/2006/documentManagement/types"/>
+    <ds:schemaRef ds:uri="http://schemas.microsoft.com/office/infopath/2007/PartnerControls"/>
+    <ds:schemaRef ds:uri="http://purl.org/dc/elements/1.1/"/>
     <ds:schemaRef ds:uri="http://schemas.microsoft.com/office/2006/metadata/properties"/>
-    <ds:schemaRef ds:uri="http://schemas.openxmlformats.org/package/2006/metadata/core-properties"/>
-    <ds:schemaRef ds:uri="http://purl.org/dc/elements/1.1/"/>
-    <ds:schemaRef ds:uri="http://purl.org/dc/terms/"/>
-    <ds:schemaRef ds:uri="http://schemas.microsoft.com/internal/obd"/>
-    <ds:schemaRef ds:uri="http://schemas.microsoft.com/office/infopath/2007/PartnerControls"/>
+    <ds:schemaRef ds:uri="http://www.w3.org/XML/1998/namespace"/>
+    <ds:schemaRef ds:uri="http://purl.org/dc/dcmitype/"/>
   </ds:schemaRefs>
 </ds:datastoreItem>
 </file>
</xml_diff>

<commit_message>
[DOC IMP]Rework on Zigbee Basic Introduction according to PA team's comments
Rework on Zigbee basic introduction according to review comments.
</commit_message>
<xml_diff>
--- a/files/ZB-2019Q4-ZMGC-Training/source/EmberZnet-and-WSTK.pptx
+++ b/files/ZB-2019Q4-ZMGC-Training/source/EmberZnet-and-WSTK.pptx
@@ -248,7 +248,7 @@
           <a:p>
             <a:fld id="{3CAB3C29-341D-6743-A203-2F7086D57830}" type="datetimeFigureOut">
               <a:rPr lang="en-US" smtClean="0"/>
-              <a:t>2020-02-12</a:t>
+              <a:t>2020-02-13</a:t>
             </a:fld>
             <a:endParaRPr lang="en-US"/>
           </a:p>
@@ -45167,21 +45167,6 @@
 </file>
 
 <file path=customXml/item1.xml><?xml version="1.0" encoding="utf-8"?>
-<p:properties xmlns:p="http://schemas.microsoft.com/office/2006/metadata/properties" xmlns:xsi="http://www.w3.org/2001/XMLSchema-instance" xmlns:pc="http://schemas.microsoft.com/office/infopath/2007/PartnerControls">
-  <documentManagement/>
-</p:properties>
-</file>
-
-<file path=customXml/item2.xml><?xml version="1.0" encoding="utf-8"?>
-<?mso-contentType ?>
-<FormTemplates xmlns="http://schemas.microsoft.com/sharepoint/v3/contenttype/forms">
-  <Display>DocumentLibraryForm</Display>
-  <Edit>DocumentLibraryForm</Edit>
-  <New>DocumentLibraryForm</New>
-</FormTemplates>
-</file>
-
-<file path=customXml/item3.xml><?xml version="1.0" encoding="utf-8"?>
 <ct:contentTypeSchema xmlns:ct="http://schemas.microsoft.com/office/2006/metadata/contentType" xmlns:ma="http://schemas.microsoft.com/office/2006/metadata/properties/metaAttributes" ct:_="" ma:_="" ma:contentTypeName="Document" ma:contentTypeID="0x010100B21F7AB2AB09B744870FD2BB34F58D4C" ma:contentTypeVersion="0" ma:contentTypeDescription="Create a new document." ma:contentTypeScope="" ma:versionID="610a13794e9c15d6bc8a774371eef038">
   <xsd:schema xmlns:xsd="http://www.w3.org/2001/XMLSchema" xmlns:xs="http://www.w3.org/2001/XMLSchema" xmlns:p="http://schemas.microsoft.com/office/2006/metadata/properties" targetNamespace="http://schemas.microsoft.com/office/2006/metadata/properties" ma:root="true" ma:fieldsID="1b05d82d297216baf5b26c55225140df">
     <xsd:element name="properties">
@@ -45295,17 +45280,33 @@
 </ct:contentTypeSchema>
 </file>
 
+<file path=customXml/item2.xml><?xml version="1.0" encoding="utf-8"?>
+<?mso-contentType ?>
+<FormTemplates xmlns="http://schemas.microsoft.com/sharepoint/v3/contenttype/forms">
+  <Display>DocumentLibraryForm</Display>
+  <Edit>DocumentLibraryForm</Edit>
+  <New>DocumentLibraryForm</New>
+</FormTemplates>
+</file>
+
+<file path=customXml/item3.xml><?xml version="1.0" encoding="utf-8"?>
+<p:properties xmlns:p="http://schemas.microsoft.com/office/2006/metadata/properties" xmlns:xsi="http://www.w3.org/2001/XMLSchema-instance" xmlns:pc="http://schemas.microsoft.com/office/infopath/2007/PartnerControls">
+  <documentManagement/>
+</p:properties>
+</file>
+
 <file path=customXml/itemProps1.xml><?xml version="1.0" encoding="utf-8"?>
-<ds:datastoreItem xmlns:ds="http://schemas.openxmlformats.org/officeDocument/2006/customXml" ds:itemID="{88E5C257-99A9-40B2-A1DE-0EB62604DA9C}">
+<ds:datastoreItem xmlns:ds="http://schemas.openxmlformats.org/officeDocument/2006/customXml" ds:itemID="{59925F4A-05CC-4D19-A5F3-6B37E808F6A7}">
   <ds:schemaRefs>
+    <ds:schemaRef ds:uri="http://schemas.microsoft.com/office/2006/metadata/contentType"/>
+    <ds:schemaRef ds:uri="http://schemas.microsoft.com/office/2006/metadata/properties/metaAttributes"/>
+    <ds:schemaRef ds:uri="http://www.w3.org/2001/XMLSchema"/>
+    <ds:schemaRef ds:uri="http://schemas.microsoft.com/office/2006/metadata/properties"/>
+    <ds:schemaRef ds:uri="http://schemas.openxmlformats.org/package/2006/metadata/core-properties"/>
+    <ds:schemaRef ds:uri="http://purl.org/dc/elements/1.1/"/>
     <ds:schemaRef ds:uri="http://purl.org/dc/terms/"/>
-    <ds:schemaRef ds:uri="http://schemas.openxmlformats.org/package/2006/metadata/core-properties"/>
-    <ds:schemaRef ds:uri="http://schemas.microsoft.com/office/2006/documentManagement/types"/>
+    <ds:schemaRef ds:uri="http://schemas.microsoft.com/internal/obd"/>
     <ds:schemaRef ds:uri="http://schemas.microsoft.com/office/infopath/2007/PartnerControls"/>
-    <ds:schemaRef ds:uri="http://purl.org/dc/elements/1.1/"/>
-    <ds:schemaRef ds:uri="http://schemas.microsoft.com/office/2006/metadata/properties"/>
-    <ds:schemaRef ds:uri="http://www.w3.org/XML/1998/namespace"/>
-    <ds:schemaRef ds:uri="http://purl.org/dc/dcmitype/"/>
   </ds:schemaRefs>
 </ds:datastoreItem>
 </file>
@@ -45319,17 +45320,16 @@
 </file>
 
 <file path=customXml/itemProps3.xml><?xml version="1.0" encoding="utf-8"?>
-<ds:datastoreItem xmlns:ds="http://schemas.openxmlformats.org/officeDocument/2006/customXml" ds:itemID="{59925F4A-05CC-4D19-A5F3-6B37E808F6A7}">
+<ds:datastoreItem xmlns:ds="http://schemas.openxmlformats.org/officeDocument/2006/customXml" ds:itemID="{88E5C257-99A9-40B2-A1DE-0EB62604DA9C}">
   <ds:schemaRefs>
-    <ds:schemaRef ds:uri="http://schemas.microsoft.com/office/2006/metadata/contentType"/>
-    <ds:schemaRef ds:uri="http://schemas.microsoft.com/office/2006/metadata/properties/metaAttributes"/>
-    <ds:schemaRef ds:uri="http://www.w3.org/2001/XMLSchema"/>
+    <ds:schemaRef ds:uri="http://purl.org/dc/terms/"/>
+    <ds:schemaRef ds:uri="http://schemas.openxmlformats.org/package/2006/metadata/core-properties"/>
+    <ds:schemaRef ds:uri="http://schemas.microsoft.com/office/2006/documentManagement/types"/>
+    <ds:schemaRef ds:uri="http://schemas.microsoft.com/office/infopath/2007/PartnerControls"/>
+    <ds:schemaRef ds:uri="http://purl.org/dc/elements/1.1/"/>
     <ds:schemaRef ds:uri="http://schemas.microsoft.com/office/2006/metadata/properties"/>
-    <ds:schemaRef ds:uri="http://schemas.openxmlformats.org/package/2006/metadata/core-properties"/>
-    <ds:schemaRef ds:uri="http://purl.org/dc/elements/1.1/"/>
-    <ds:schemaRef ds:uri="http://purl.org/dc/terms/"/>
-    <ds:schemaRef ds:uri="http://schemas.microsoft.com/internal/obd"/>
-    <ds:schemaRef ds:uri="http://schemas.microsoft.com/office/infopath/2007/PartnerControls"/>
+    <ds:schemaRef ds:uri="http://www.w3.org/XML/1998/namespace"/>
+    <ds:schemaRef ds:uri="http://purl.org/dc/dcmitype/"/>
   </ds:schemaRefs>
 </ds:datastoreItem>
 </file>
</xml_diff>